<commit_message>
01-Excel - Day 3 - New Slides
</commit_message>
<xml_diff>
--- a/01-Excel/3/Excel_Analytics.pptx
+++ b/01-Excel/3/Excel_Analytics.pptx
@@ -4479,6 +4479,66 @@
           </a:p>
         </p:txBody>
       </p:sp>
+      <p:sp>
+        <p:nvSpPr>
+          <p:cNvPr id="4" name="TextBox 3"/>
+          <p:cNvSpPr txBox="1"/>
+          <p:nvPr/>
+        </p:nvSpPr>
+        <p:spPr>
+          <a:xfrm>
+            <a:off x="1257300" y="5466517"/>
+            <a:ext cx="6248400" cy="923330"/>
+          </a:xfrm>
+          <a:prstGeom prst="rect">
+            <a:avLst/>
+          </a:prstGeom>
+          <a:noFill/>
+        </p:spPr>
+        <p:txBody>
+          <a:bodyPr wrap="square" rtlCol="0">
+            <a:spAutoFit/>
+          </a:bodyPr>
+          <a:lstStyle/>
+          <a:p>
+            <a:r>
+              <a:rPr lang="en-US" dirty="0" smtClean="0"/>
+              <a:t>Robert </a:t>
+            </a:r>
+            <a:r>
+              <a:rPr lang="en-US" dirty="0" err="1" smtClean="0"/>
+              <a:t>Nau</a:t>
+            </a:r>
+            <a:r>
+              <a:rPr lang="en-US" dirty="0" smtClean="0"/>
+              <a:t>, Duke University, School of Business,  </a:t>
+            </a:r>
+            <a:r>
+              <a:rPr lang="en-US" dirty="0" smtClean="0">
+                <a:hlinkClick r:id="rId2"/>
+              </a:rPr>
+              <a:t>https</a:t>
+            </a:r>
+            <a:r>
+              <a:rPr lang="en-US" dirty="0">
+                <a:hlinkClick r:id="rId2"/>
+              </a:rPr>
+              <a:t>://people.duke.edu/~</a:t>
+            </a:r>
+            <a:r>
+              <a:rPr lang="en-US" dirty="0" smtClean="0">
+                <a:hlinkClick r:id="rId2"/>
+              </a:rPr>
+              <a:t>rnau/mathreg.htm</a:t>
+            </a:r>
+            <a:r>
+              <a:rPr lang="en-US" dirty="0" smtClean="0"/>
+              <a:t> , Date Accessed – 2/27/2019</a:t>
+            </a:r>
+            <a:endParaRPr lang="en-US" dirty="0"/>
+          </a:p>
+        </p:txBody>
+      </p:sp>
     </p:spTree>
     <p:extLst>
       <p:ext uri="{BB962C8B-B14F-4D97-AF65-F5344CB8AC3E}">
@@ -5006,6 +5066,66 @@
           </a:extLst>
         </p:spPr>
       </p:pic>
+      <p:sp>
+        <p:nvSpPr>
+          <p:cNvPr id="4" name="TextBox 3"/>
+          <p:cNvSpPr txBox="1"/>
+          <p:nvPr/>
+        </p:nvSpPr>
+        <p:spPr>
+          <a:xfrm>
+            <a:off x="1257300" y="5486400"/>
+            <a:ext cx="6248400" cy="923330"/>
+          </a:xfrm>
+          <a:prstGeom prst="rect">
+            <a:avLst/>
+          </a:prstGeom>
+          <a:noFill/>
+        </p:spPr>
+        <p:txBody>
+          <a:bodyPr wrap="square" rtlCol="0">
+            <a:spAutoFit/>
+          </a:bodyPr>
+          <a:lstStyle/>
+          <a:p>
+            <a:r>
+              <a:rPr lang="en-US" dirty="0" smtClean="0"/>
+              <a:t>Robert </a:t>
+            </a:r>
+            <a:r>
+              <a:rPr lang="en-US" dirty="0" err="1" smtClean="0"/>
+              <a:t>Nau</a:t>
+            </a:r>
+            <a:r>
+              <a:rPr lang="en-US" dirty="0" smtClean="0"/>
+              <a:t>, Duke University, School of Business,  </a:t>
+            </a:r>
+            <a:r>
+              <a:rPr lang="en-US" dirty="0" smtClean="0">
+                <a:hlinkClick r:id="rId3"/>
+              </a:rPr>
+              <a:t>https</a:t>
+            </a:r>
+            <a:r>
+              <a:rPr lang="en-US" dirty="0">
+                <a:hlinkClick r:id="rId3"/>
+              </a:rPr>
+              <a:t>://people.duke.edu/~</a:t>
+            </a:r>
+            <a:r>
+              <a:rPr lang="en-US" dirty="0" smtClean="0">
+                <a:hlinkClick r:id="rId3"/>
+              </a:rPr>
+              <a:t>rnau/mathreg.htm</a:t>
+            </a:r>
+            <a:r>
+              <a:rPr lang="en-US" dirty="0" smtClean="0"/>
+              <a:t> , Date Accessed – 2/27/2019</a:t>
+            </a:r>
+            <a:endParaRPr lang="en-US" dirty="0"/>
+          </a:p>
+        </p:txBody>
+      </p:sp>
     </p:spTree>
     <p:extLst>
       <p:ext uri="{BB962C8B-B14F-4D97-AF65-F5344CB8AC3E}">
@@ -6122,7 +6242,7 @@
         <p:spPr>
           <a:xfrm>
             <a:off x="228600" y="685800"/>
-            <a:ext cx="8610600" cy="4801314"/>
+            <a:ext cx="8610600" cy="5078313"/>
           </a:xfrm>
           <a:prstGeom prst="rect">
             <a:avLst/>
@@ -6227,13 +6347,32 @@
             </a:r>
           </a:p>
           <a:p>
+            <a:pPr marL="742950" lvl="1" indent="-285750">
+              <a:buFont typeface="Arial" panose="020B0604020202020204" pitchFamily="34" charset="0"/>
+              <a:buChar char="•"/>
+            </a:pPr>
+            <a:r>
+              <a:rPr lang="en-US" dirty="0" smtClean="0"/>
+              <a:t>Taking logs (reduce noise)</a:t>
+            </a:r>
+            <a:endParaRPr lang="en-US" dirty="0" smtClean="0"/>
+          </a:p>
+          <a:p>
             <a:pPr marL="285750" indent="-285750">
               <a:buFont typeface="Arial" panose="020B0604020202020204" pitchFamily="34" charset="0"/>
               <a:buChar char="•"/>
             </a:pPr>
             <a:r>
               <a:rPr lang="en-US" b="1" dirty="0" smtClean="0"/>
-              <a:t>Statistical Inference (Predictive analytics) </a:t>
+              <a:t>Statistical Inference (Predictive </a:t>
+            </a:r>
+            <a:r>
+              <a:rPr lang="en-US" b="1" dirty="0" smtClean="0"/>
+              <a:t>Analytics</a:t>
+            </a:r>
+            <a:r>
+              <a:rPr lang="en-US" b="1" dirty="0" smtClean="0"/>
+              <a:t>) </a:t>
             </a:r>
             <a:r>
               <a:rPr lang="en-US" dirty="0" smtClean="0"/>
@@ -6307,7 +6446,7 @@
         </p:nvSpPr>
         <p:spPr>
           <a:xfrm>
-            <a:off x="990600" y="5225504"/>
+            <a:off x="990600" y="5388084"/>
             <a:ext cx="7696200" cy="523220"/>
           </a:xfrm>
           <a:prstGeom prst="rect">
@@ -6358,7 +6497,7 @@
         </p:nvSpPr>
         <p:spPr>
           <a:xfrm>
-            <a:off x="990600" y="5791200"/>
+            <a:off x="990600" y="5953780"/>
             <a:ext cx="7162800" cy="523220"/>
           </a:xfrm>
           <a:prstGeom prst="rect">
@@ -6787,6 +6926,49 @@
                                   </p:childTnLst>
                                 </p:cTn>
                               </p:par>
+                              <p:par>
+                                <p:cTn id="29" presetID="10" presetClass="entr" presetSubtype="0" fill="hold" nodeType="withEffect">
+                                  <p:stCondLst>
+                                    <p:cond delay="0"/>
+                                  </p:stCondLst>
+                                  <p:childTnLst>
+                                    <p:set>
+                                      <p:cBhvr>
+                                        <p:cTn id="30" dur="1" fill="hold">
+                                          <p:stCondLst>
+                                            <p:cond delay="0"/>
+                                          </p:stCondLst>
+                                        </p:cTn>
+                                        <p:tgtEl>
+                                          <p:spTgt spid="4">
+                                            <p:txEl>
+                                              <p:pRg st="8" end="8"/>
+                                            </p:txEl>
+                                          </p:spTgt>
+                                        </p:tgtEl>
+                                        <p:attrNameLst>
+                                          <p:attrName>style.visibility</p:attrName>
+                                        </p:attrNameLst>
+                                      </p:cBhvr>
+                                      <p:to>
+                                        <p:strVal val="visible"/>
+                                      </p:to>
+                                    </p:set>
+                                    <p:animEffect transition="in" filter="fade">
+                                      <p:cBhvr>
+                                        <p:cTn id="31" dur="500"/>
+                                        <p:tgtEl>
+                                          <p:spTgt spid="4">
+                                            <p:txEl>
+                                              <p:pRg st="8" end="8"/>
+                                            </p:txEl>
+                                          </p:spTgt>
+                                        </p:tgtEl>
+                                      </p:cBhvr>
+                                    </p:animEffect>
+                                  </p:childTnLst>
+                                </p:cTn>
+                              </p:par>
                             </p:childTnLst>
                           </p:cTn>
                         </p:par>
@@ -6794,62 +6976,19 @@
                     </p:cTn>
                   </p:par>
                   <p:par>
-                    <p:cTn id="29" fill="hold">
+                    <p:cTn id="32" fill="hold">
                       <p:stCondLst>
                         <p:cond delay="indefinite"/>
                       </p:stCondLst>
                       <p:childTnLst>
                         <p:par>
-                          <p:cTn id="30" fill="hold">
+                          <p:cTn id="33" fill="hold">
                             <p:stCondLst>
                               <p:cond delay="0"/>
                             </p:stCondLst>
                             <p:childTnLst>
                               <p:par>
-                                <p:cTn id="31" presetID="10" presetClass="entr" presetSubtype="0" fill="hold" nodeType="clickEffect">
-                                  <p:stCondLst>
-                                    <p:cond delay="0"/>
-                                  </p:stCondLst>
-                                  <p:childTnLst>
-                                    <p:set>
-                                      <p:cBhvr>
-                                        <p:cTn id="32" dur="1" fill="hold">
-                                          <p:stCondLst>
-                                            <p:cond delay="0"/>
-                                          </p:stCondLst>
-                                        </p:cTn>
-                                        <p:tgtEl>
-                                          <p:spTgt spid="4">
-                                            <p:txEl>
-                                              <p:pRg st="8" end="8"/>
-                                            </p:txEl>
-                                          </p:spTgt>
-                                        </p:tgtEl>
-                                        <p:attrNameLst>
-                                          <p:attrName>style.visibility</p:attrName>
-                                        </p:attrNameLst>
-                                      </p:cBhvr>
-                                      <p:to>
-                                        <p:strVal val="visible"/>
-                                      </p:to>
-                                    </p:set>
-                                    <p:animEffect transition="in" filter="fade">
-                                      <p:cBhvr>
-                                        <p:cTn id="33" dur="500"/>
-                                        <p:tgtEl>
-                                          <p:spTgt spid="4">
-                                            <p:txEl>
-                                              <p:pRg st="8" end="8"/>
-                                            </p:txEl>
-                                          </p:spTgt>
-                                        </p:tgtEl>
-                                      </p:cBhvr>
-                                    </p:animEffect>
-                                  </p:childTnLst>
-                                </p:cTn>
-                              </p:par>
-                              <p:par>
-                                <p:cTn id="34" presetID="10" presetClass="entr" presetSubtype="0" fill="hold" nodeType="withEffect">
+                                <p:cTn id="34" presetID="10" presetClass="entr" presetSubtype="0" fill="hold" nodeType="clickEffect">
                                   <p:stCondLst>
                                     <p:cond delay="0"/>
                                   </p:stCondLst>
@@ -7063,6 +7202,49 @@
                                   </p:childTnLst>
                                 </p:cTn>
                               </p:par>
+                              <p:par>
+                                <p:cTn id="49" presetID="10" presetClass="entr" presetSubtype="0" fill="hold" nodeType="withEffect">
+                                  <p:stCondLst>
+                                    <p:cond delay="0"/>
+                                  </p:stCondLst>
+                                  <p:childTnLst>
+                                    <p:set>
+                                      <p:cBhvr>
+                                        <p:cTn id="50" dur="1" fill="hold">
+                                          <p:stCondLst>
+                                            <p:cond delay="0"/>
+                                          </p:stCondLst>
+                                        </p:cTn>
+                                        <p:tgtEl>
+                                          <p:spTgt spid="4">
+                                            <p:txEl>
+                                              <p:pRg st="14" end="14"/>
+                                            </p:txEl>
+                                          </p:spTgt>
+                                        </p:tgtEl>
+                                        <p:attrNameLst>
+                                          <p:attrName>style.visibility</p:attrName>
+                                        </p:attrNameLst>
+                                      </p:cBhvr>
+                                      <p:to>
+                                        <p:strVal val="visible"/>
+                                      </p:to>
+                                    </p:set>
+                                    <p:animEffect transition="in" filter="fade">
+                                      <p:cBhvr>
+                                        <p:cTn id="51" dur="500"/>
+                                        <p:tgtEl>
+                                          <p:spTgt spid="4">
+                                            <p:txEl>
+                                              <p:pRg st="14" end="14"/>
+                                            </p:txEl>
+                                          </p:spTgt>
+                                        </p:tgtEl>
+                                      </p:cBhvr>
+                                    </p:animEffect>
+                                  </p:childTnLst>
+                                </p:cTn>
+                              </p:par>
                             </p:childTnLst>
                           </p:cTn>
                         </p:par>
@@ -7070,26 +7252,26 @@
                     </p:cTn>
                   </p:par>
                   <p:par>
-                    <p:cTn id="49" fill="hold">
+                    <p:cTn id="52" fill="hold">
                       <p:stCondLst>
                         <p:cond delay="indefinite"/>
                       </p:stCondLst>
                       <p:childTnLst>
                         <p:par>
-                          <p:cTn id="50" fill="hold">
+                          <p:cTn id="53" fill="hold">
                             <p:stCondLst>
                               <p:cond delay="0"/>
                             </p:stCondLst>
                             <p:childTnLst>
                               <p:par>
-                                <p:cTn id="51" presetID="10" presetClass="entr" presetSubtype="0" fill="hold" grpId="0" nodeType="clickEffect">
+                                <p:cTn id="54" presetID="10" presetClass="entr" presetSubtype="0" fill="hold" grpId="0" nodeType="clickEffect">
                                   <p:stCondLst>
                                     <p:cond delay="0"/>
                                   </p:stCondLst>
                                   <p:childTnLst>
                                     <p:set>
                                       <p:cBhvr>
-                                        <p:cTn id="52" dur="1" fill="hold">
+                                        <p:cTn id="55" dur="1" fill="hold">
                                           <p:stCondLst>
                                             <p:cond delay="0"/>
                                           </p:stCondLst>
@@ -7107,7 +7289,7 @@
                                     </p:set>
                                     <p:animEffect transition="in" filter="fade">
                                       <p:cBhvr>
-                                        <p:cTn id="53" dur="500"/>
+                                        <p:cTn id="56" dur="500"/>
                                         <p:tgtEl>
                                           <p:spTgt spid="5"/>
                                         </p:tgtEl>
@@ -7117,14 +7299,14 @@
                                 </p:cTn>
                               </p:par>
                               <p:par>
-                                <p:cTn id="54" presetID="10" presetClass="entr" presetSubtype="0" fill="hold" grpId="0" nodeType="withEffect">
+                                <p:cTn id="57" presetID="10" presetClass="entr" presetSubtype="0" fill="hold" grpId="0" nodeType="withEffect">
                                   <p:stCondLst>
                                     <p:cond delay="0"/>
                                   </p:stCondLst>
                                   <p:childTnLst>
                                     <p:set>
                                       <p:cBhvr>
-                                        <p:cTn id="55" dur="1" fill="hold">
+                                        <p:cTn id="58" dur="1" fill="hold">
                                           <p:stCondLst>
                                             <p:cond delay="0"/>
                                           </p:stCondLst>
@@ -7142,7 +7324,7 @@
                                     </p:set>
                                     <p:animEffect transition="in" filter="fade">
                                       <p:cBhvr>
-                                        <p:cTn id="56" dur="500"/>
+                                        <p:cTn id="59" dur="500"/>
                                         <p:tgtEl>
                                           <p:spTgt spid="6"/>
                                         </p:tgtEl>
@@ -10909,14 +11091,14 @@
           <p:nvPr>
             <p:extLst>
               <p:ext uri="{D42A27DB-BD31-4B8C-83A1-F6EECF244321}">
-                <p14:modId xmlns:p14="http://schemas.microsoft.com/office/powerpoint/2010/main" val="4078266020"/>
+                <p14:modId xmlns:p14="http://schemas.microsoft.com/office/powerpoint/2010/main" val="7864869"/>
               </p:ext>
             </p:extLst>
           </p:nvPr>
         </p:nvGraphicFramePr>
         <p:xfrm>
           <a:off x="473964" y="2438400"/>
-          <a:ext cx="8382000" cy="2667000"/>
+          <a:ext cx="8382000" cy="3037840"/>
         </p:xfrm>
         <a:graphic>
           <a:graphicData uri="http://schemas.openxmlformats.org/drawingml/2006/table">
@@ -11106,6 +11288,50 @@
                       <a:r>
                         <a:rPr lang="en-US" dirty="0" smtClean="0"/>
                         <a:t>Coefficient</a:t>
+                      </a:r>
+                      <a:endParaRPr lang="en-US" dirty="0"/>
+                    </a:p>
+                  </a:txBody>
+                  <a:tcPr/>
+                </a:tc>
+              </a:tr>
+              <a:tr h="370840">
+                <a:tc>
+                  <a:txBody>
+                    <a:bodyPr/>
+                    <a:lstStyle/>
+                    <a:p>
+                      <a:r>
+                        <a:rPr lang="en-US" dirty="0" smtClean="0"/>
+                        <a:t>B</a:t>
+                      </a:r>
+                      <a:endParaRPr lang="en-US" dirty="0"/>
+                    </a:p>
+                  </a:txBody>
+                  <a:tcPr/>
+                </a:tc>
+                <a:tc>
+                  <a:txBody>
+                    <a:bodyPr/>
+                    <a:lstStyle/>
+                    <a:p>
+                      <a:r>
+                        <a:rPr lang="en-US" dirty="0" smtClean="0"/>
+                        <a:t>Intercept</a:t>
+                      </a:r>
+                      <a:endParaRPr lang="en-US" dirty="0"/>
+                    </a:p>
+                  </a:txBody>
+                  <a:tcPr/>
+                </a:tc>
+                <a:tc>
+                  <a:txBody>
+                    <a:bodyPr/>
+                    <a:lstStyle/>
+                    <a:p>
+                      <a:r>
+                        <a:rPr lang="en-US" dirty="0" smtClean="0"/>
+                        <a:t>Intercept</a:t>
                       </a:r>
                       <a:endParaRPr lang="en-US" dirty="0"/>
                     </a:p>

</xml_diff>